<commit_message>
Revise the mistakes in lab04-ppt
</commit_message>
<xml_diff>
--- a/lab04-googletest/00-lab04.pptx
+++ b/lab04-googletest/00-lab04.pptx
@@ -357,7 +357,7 @@
             <a:fld id="{B61BEF0D-F0BB-DE4B-95CE-6DB70DBA9567}" type="datetimeFigureOut">
               <a:rPr lang="en-US" dirty="0"/>
               <a:pPr/>
-              <a:t>12/6/2021</a:t>
+              <a:t>5/12/2022</a:t>
             </a:fld>
             <a:endParaRPr lang="en-US" dirty="0"/>
           </a:p>
@@ -688,7 +688,7 @@
             <a:fld id="{B61BEF0D-F0BB-DE4B-95CE-6DB70DBA9567}" type="datetimeFigureOut">
               <a:rPr lang="en-US" dirty="0"/>
               <a:pPr/>
-              <a:t>12/6/2021</a:t>
+              <a:t>5/12/2022</a:t>
             </a:fld>
             <a:endParaRPr lang="en-US" dirty="0"/>
           </a:p>
@@ -963,7 +963,7 @@
             <a:fld id="{B61BEF0D-F0BB-DE4B-95CE-6DB70DBA9567}" type="datetimeFigureOut">
               <a:rPr lang="en-US" dirty="0"/>
               <a:pPr/>
-              <a:t>12/6/2021</a:t>
+              <a:t>5/12/2022</a:t>
             </a:fld>
             <a:endParaRPr lang="en-US" dirty="0"/>
           </a:p>
@@ -1528,7 +1528,7 @@
             <a:fld id="{B61BEF0D-F0BB-DE4B-95CE-6DB70DBA9567}" type="datetimeFigureOut">
               <a:rPr lang="en-US" dirty="0"/>
               <a:pPr/>
-              <a:t>12/6/2021</a:t>
+              <a:t>5/12/2022</a:t>
             </a:fld>
             <a:endParaRPr lang="en-US" dirty="0"/>
           </a:p>
@@ -1803,7 +1803,7 @@
             <a:fld id="{B61BEF0D-F0BB-DE4B-95CE-6DB70DBA9567}" type="datetimeFigureOut">
               <a:rPr lang="en-US" dirty="0"/>
               <a:pPr/>
-              <a:t>12/6/2021</a:t>
+              <a:t>5/12/2022</a:t>
             </a:fld>
             <a:endParaRPr lang="en-US" dirty="0"/>
           </a:p>
@@ -2362,7 +2362,7 @@
             <a:fld id="{B61BEF0D-F0BB-DE4B-95CE-6DB70DBA9567}" type="datetimeFigureOut">
               <a:rPr lang="en-US" dirty="0"/>
               <a:pPr/>
-              <a:t>12/6/2021</a:t>
+              <a:t>5/12/2022</a:t>
             </a:fld>
             <a:endParaRPr lang="en-US" dirty="0"/>
           </a:p>
@@ -2686,7 +2686,7 @@
             <a:fld id="{B61BEF0D-F0BB-DE4B-95CE-6DB70DBA9567}" type="datetimeFigureOut">
               <a:rPr lang="en-US" dirty="0"/>
               <a:pPr/>
-              <a:t>12/6/2021</a:t>
+              <a:t>5/12/2022</a:t>
             </a:fld>
             <a:endParaRPr lang="en-US" dirty="0"/>
           </a:p>
@@ -2860,7 +2860,7 @@
             <a:fld id="{B61BEF0D-F0BB-DE4B-95CE-6DB70DBA9567}" type="datetimeFigureOut">
               <a:rPr lang="en-US" dirty="0"/>
               <a:pPr/>
-              <a:t>12/6/2021</a:t>
+              <a:t>5/12/2022</a:t>
             </a:fld>
             <a:endParaRPr lang="en-US" dirty="0"/>
           </a:p>
@@ -3095,7 +3095,7 @@
             <a:fld id="{B61BEF0D-F0BB-DE4B-95CE-6DB70DBA9567}" type="datetimeFigureOut">
               <a:rPr lang="en-US" dirty="0"/>
               <a:pPr/>
-              <a:t>12/6/2021</a:t>
+              <a:t>5/12/2022</a:t>
             </a:fld>
             <a:endParaRPr lang="en-US" dirty="0"/>
           </a:p>
@@ -3292,7 +3292,7 @@
             <a:fld id="{B61BEF0D-F0BB-DE4B-95CE-6DB70DBA9567}" type="datetimeFigureOut">
               <a:rPr lang="en-US" dirty="0"/>
               <a:pPr/>
-              <a:t>12/6/2021</a:t>
+              <a:t>5/12/2022</a:t>
             </a:fld>
             <a:endParaRPr lang="en-US" dirty="0"/>
           </a:p>
@@ -3565,7 +3565,7 @@
             <a:fld id="{B61BEF0D-F0BB-DE4B-95CE-6DB70DBA9567}" type="datetimeFigureOut">
               <a:rPr lang="en-US" dirty="0"/>
               <a:pPr/>
-              <a:t>12/6/2021</a:t>
+              <a:t>5/12/2022</a:t>
             </a:fld>
             <a:endParaRPr lang="en-US" dirty="0"/>
           </a:p>
@@ -3828,7 +3828,7 @@
             <a:fld id="{B61BEF0D-F0BB-DE4B-95CE-6DB70DBA9567}" type="datetimeFigureOut">
               <a:rPr lang="en-US" dirty="0"/>
               <a:pPr/>
-              <a:t>12/6/2021</a:t>
+              <a:t>5/12/2022</a:t>
             </a:fld>
             <a:endParaRPr lang="en-US" dirty="0"/>
           </a:p>
@@ -4199,7 +4199,7 @@
             <a:fld id="{B61BEF0D-F0BB-DE4B-95CE-6DB70DBA9567}" type="datetimeFigureOut">
               <a:rPr lang="en-US" dirty="0"/>
               <a:pPr/>
-              <a:t>12/6/2021</a:t>
+              <a:t>5/12/2022</a:t>
             </a:fld>
             <a:endParaRPr lang="en-US" dirty="0"/>
           </a:p>
@@ -4344,7 +4344,7 @@
             <a:fld id="{B61BEF0D-F0BB-DE4B-95CE-6DB70DBA9567}" type="datetimeFigureOut">
               <a:rPr lang="en-US" dirty="0"/>
               <a:pPr/>
-              <a:t>12/6/2021</a:t>
+              <a:t>5/12/2022</a:t>
             </a:fld>
             <a:endParaRPr lang="en-US" dirty="0"/>
           </a:p>
@@ -4466,7 +4466,7 @@
             <a:fld id="{B61BEF0D-F0BB-DE4B-95CE-6DB70DBA9567}" type="datetimeFigureOut">
               <a:rPr lang="en-US" dirty="0"/>
               <a:pPr/>
-              <a:t>12/6/2021</a:t>
+              <a:t>5/12/2022</a:t>
             </a:fld>
             <a:endParaRPr lang="en-US" dirty="0"/>
           </a:p>
@@ -4748,7 +4748,7 @@
             <a:fld id="{B61BEF0D-F0BB-DE4B-95CE-6DB70DBA9567}" type="datetimeFigureOut">
               <a:rPr lang="en-US" dirty="0"/>
               <a:pPr/>
-              <a:t>12/6/2021</a:t>
+              <a:t>5/12/2022</a:t>
             </a:fld>
             <a:endParaRPr lang="en-US" dirty="0"/>
           </a:p>
@@ -5069,7 +5069,7 @@
             <a:fld id="{B61BEF0D-F0BB-DE4B-95CE-6DB70DBA9567}" type="datetimeFigureOut">
               <a:rPr lang="en-US" dirty="0"/>
               <a:pPr/>
-              <a:t>12/6/2021</a:t>
+              <a:t>5/12/2022</a:t>
             </a:fld>
             <a:endParaRPr lang="en-US" dirty="0"/>
           </a:p>
@@ -5280,7 +5280,7 @@
             <a:fld id="{B61BEF0D-F0BB-DE4B-95CE-6DB70DBA9567}" type="datetimeFigureOut">
               <a:rPr lang="en-US" dirty="0"/>
               <a:pPr/>
-              <a:t>12/6/2021</a:t>
+              <a:t>5/12/2022</a:t>
             </a:fld>
             <a:endParaRPr lang="en-US" dirty="0"/>
           </a:p>
@@ -6073,7 +6073,7 @@
           <a:p>
             <a:r>
               <a:rPr lang="en-US" altLang="zh-TW" dirty="0"/>
-              <a:t>EXCEPT will continue the testing and generate non-fatal failures when errors are detected</a:t>
+              <a:t>EXPECT will continue the testing and generate non-fatal failures when errors are detected</a:t>
             </a:r>
             <a:endParaRPr lang="zh-TW" altLang="en-US" dirty="0"/>
           </a:p>
@@ -8292,7 +8292,13 @@
           <p:cNvGraphicFramePr>
             <a:graphicFrameLocks noGrp="1"/>
           </p:cNvGraphicFramePr>
-          <p:nvPr/>
+          <p:nvPr>
+            <p:extLst>
+              <p:ext uri="{D42A27DB-BD31-4B8C-83A1-F6EECF244321}">
+                <p14:modId xmlns:p14="http://schemas.microsoft.com/office/powerpoint/2010/main" val="2210991588"/>
+              </p:ext>
+            </p:extLst>
+          </p:nvPr>
         </p:nvGraphicFramePr>
         <p:xfrm>
           <a:off x="755008" y="5005588"/>
@@ -8477,6 +8483,21 @@
                       <a:pPr algn="ctr"/>
                       <a:r>
                         <a:rPr lang="en-US" altLang="zh-TW" dirty="0"/>
+                        <a:t>3</a:t>
+                      </a:r>
+                      <a:endParaRPr lang="zh-TW" altLang="en-US" dirty="0"/>
+                    </a:p>
+                  </a:txBody>
+                  <a:tcPr/>
+                </a:tc>
+                <a:tc>
+                  <a:txBody>
+                    <a:bodyPr/>
+                    <a:lstStyle/>
+                    <a:p>
+                      <a:pPr algn="ctr"/>
+                      <a:r>
+                        <a:rPr lang="en-US" altLang="zh-TW" dirty="0"/>
                         <a:t>4</a:t>
                       </a:r>
                       <a:endParaRPr lang="zh-TW" altLang="en-US" dirty="0"/>
@@ -8484,6 +8505,13 @@
                   </a:txBody>
                   <a:tcPr/>
                 </a:tc>
+                <a:extLst>
+                  <a:ext uri="{0D108BD9-81ED-4DB2-BD59-A6C34878D82A}">
+                    <a16:rowId xmlns:a16="http://schemas.microsoft.com/office/drawing/2014/main" val="1838442169"/>
+                  </a:ext>
+                </a:extLst>
+              </a:tr>
+              <a:tr h="370840">
                 <a:tc>
                   <a:txBody>
                     <a:bodyPr/>
@@ -8499,13 +8527,6 @@
                   </a:txBody>
                   <a:tcPr/>
                 </a:tc>
-                <a:extLst>
-                  <a:ext uri="{0D108BD9-81ED-4DB2-BD59-A6C34878D82A}">
-                    <a16:rowId xmlns:a16="http://schemas.microsoft.com/office/drawing/2014/main" val="1838442169"/>
-                  </a:ext>
-                </a:extLst>
-              </a:tr>
-              <a:tr h="370840">
                 <a:tc>
                   <a:txBody>
                     <a:bodyPr/>
@@ -8566,6 +8587,13 @@
                   </a:txBody>
                   <a:tcPr/>
                 </a:tc>
+                <a:extLst>
+                  <a:ext uri="{0D108BD9-81ED-4DB2-BD59-A6C34878D82A}">
+                    <a16:rowId xmlns:a16="http://schemas.microsoft.com/office/drawing/2014/main" val="2666442926"/>
+                  </a:ext>
+                </a:extLst>
+              </a:tr>
+              <a:tr h="370840">
                 <a:tc>
                   <a:txBody>
                     <a:bodyPr/>
@@ -8581,13 +8609,6 @@
                   </a:txBody>
                   <a:tcPr/>
                 </a:tc>
-                <a:extLst>
-                  <a:ext uri="{0D108BD9-81ED-4DB2-BD59-A6C34878D82A}">
-                    <a16:rowId xmlns:a16="http://schemas.microsoft.com/office/drawing/2014/main" val="2666442926"/>
-                  </a:ext>
-                </a:extLst>
-              </a:tr>
-              <a:tr h="370840">
                 <a:tc>
                   <a:txBody>
                     <a:bodyPr/>
@@ -8597,21 +8618,6 @@
                       <a:r>
                         <a:rPr lang="en-US" altLang="zh-TW" dirty="0"/>
                         <a:t>11</a:t>
-                      </a:r>
-                      <a:endParaRPr lang="zh-TW" altLang="en-US" dirty="0"/>
-                    </a:p>
-                  </a:txBody>
-                  <a:tcPr/>
-                </a:tc>
-                <a:tc>
-                  <a:txBody>
-                    <a:bodyPr/>
-                    <a:lstStyle/>
-                    <a:p>
-                      <a:pPr algn="ctr"/>
-                      <a:r>
-                        <a:rPr lang="en-US" altLang="zh-TW" dirty="0"/>
-                        <a:t>12</a:t>
                       </a:r>
                       <a:endParaRPr lang="zh-TW" altLang="en-US" dirty="0"/>
                     </a:p>
@@ -8751,7 +8757,13 @@
           <p:cNvGraphicFramePr>
             <a:graphicFrameLocks noGrp="1"/>
           </p:cNvGraphicFramePr>
-          <p:nvPr/>
+          <p:nvPr>
+            <p:extLst>
+              <p:ext uri="{D42A27DB-BD31-4B8C-83A1-F6EECF244321}">
+                <p14:modId xmlns:p14="http://schemas.microsoft.com/office/powerpoint/2010/main" val="4152151837"/>
+              </p:ext>
+            </p:extLst>
+          </p:nvPr>
         </p:nvGraphicFramePr>
         <p:xfrm>
           <a:off x="6611922" y="5005588"/>
@@ -8936,6 +8948,21 @@
                       <a:pPr algn="ctr"/>
                       <a:r>
                         <a:rPr lang="en-US" altLang="zh-TW" dirty="0"/>
+                        <a:t>3</a:t>
+                      </a:r>
+                      <a:endParaRPr lang="zh-TW" altLang="en-US" dirty="0"/>
+                    </a:p>
+                  </a:txBody>
+                  <a:tcPr/>
+                </a:tc>
+                <a:tc>
+                  <a:txBody>
+                    <a:bodyPr/>
+                    <a:lstStyle/>
+                    <a:p>
+                      <a:pPr algn="ctr"/>
+                      <a:r>
+                        <a:rPr lang="en-US" altLang="zh-TW" dirty="0"/>
                         <a:t>4</a:t>
                       </a:r>
                       <a:endParaRPr lang="zh-TW" altLang="en-US" dirty="0"/>
@@ -8943,6 +8970,13 @@
                   </a:txBody>
                   <a:tcPr/>
                 </a:tc>
+                <a:extLst>
+                  <a:ext uri="{0D108BD9-81ED-4DB2-BD59-A6C34878D82A}">
+                    <a16:rowId xmlns:a16="http://schemas.microsoft.com/office/drawing/2014/main" val="1838442169"/>
+                  </a:ext>
+                </a:extLst>
+              </a:tr>
+              <a:tr h="370840">
                 <a:tc>
                   <a:txBody>
                     <a:bodyPr/>
@@ -8958,13 +8992,6 @@
                   </a:txBody>
                   <a:tcPr/>
                 </a:tc>
-                <a:extLst>
-                  <a:ext uri="{0D108BD9-81ED-4DB2-BD59-A6C34878D82A}">
-                    <a16:rowId xmlns:a16="http://schemas.microsoft.com/office/drawing/2014/main" val="1838442169"/>
-                  </a:ext>
-                </a:extLst>
-              </a:tr>
-              <a:tr h="370840">
                 <a:tc>
                   <a:txBody>
                     <a:bodyPr/>
@@ -9025,21 +9052,6 @@
                   </a:txBody>
                   <a:tcPr/>
                 </a:tc>
-                <a:tc>
-                  <a:txBody>
-                    <a:bodyPr/>
-                    <a:lstStyle/>
-                    <a:p>
-                      <a:pPr algn="ctr"/>
-                      <a:r>
-                        <a:rPr lang="en-US" altLang="zh-TW" dirty="0"/>
-                        <a:t>10</a:t>
-                      </a:r>
-                      <a:endParaRPr lang="zh-TW" altLang="en-US" dirty="0"/>
-                    </a:p>
-                  </a:txBody>
-                  <a:tcPr/>
-                </a:tc>
                 <a:extLst>
                   <a:ext uri="{0D108BD9-81ED-4DB2-BD59-A6C34878D82A}">
                     <a16:rowId xmlns:a16="http://schemas.microsoft.com/office/drawing/2014/main" val="2666442926"/>
@@ -9059,7 +9071,7 @@
                             <a:srgbClr val="FF0000"/>
                           </a:solidFill>
                         </a:rPr>
-                        <a:t>11</a:t>
+                        <a:t>10</a:t>
                       </a:r>
                       <a:br>
                         <a:rPr lang="en-US" altLang="zh-TW" dirty="0"/>
@@ -9085,7 +9097,7 @@
                             <a:srgbClr val="FF0000"/>
                           </a:solidFill>
                         </a:rPr>
-                        <a:t>12</a:t>
+                        <a:t>11</a:t>
                       </a:r>
                     </a:p>
                     <a:p>

</xml_diff>

<commit_message>
Add new context in lab04-ppt
</commit_message>
<xml_diff>
--- a/lab04-googletest/00-lab04.pptx
+++ b/lab04-googletest/00-lab04.pptx
@@ -7755,6 +7755,42 @@
           </a:ln>
         </p:spPr>
       </p:pic>
+      <p:sp>
+        <p:nvSpPr>
+          <p:cNvPr id="3" name="文字方塊 2">
+            <a:extLst>
+              <a:ext uri="{FF2B5EF4-FFF2-40B4-BE49-F238E27FC236}">
+                <a16:creationId xmlns:a16="http://schemas.microsoft.com/office/drawing/2014/main" id="{65B55F7E-B991-6BCE-2D19-6A3466AF923E}"/>
+              </a:ext>
+            </a:extLst>
+          </p:cNvPr>
+          <p:cNvSpPr txBox="1"/>
+          <p:nvPr/>
+        </p:nvSpPr>
+        <p:spPr>
+          <a:xfrm>
+            <a:off x="581025" y="6096000"/>
+            <a:ext cx="10131425" cy="369332"/>
+          </a:xfrm>
+          <a:prstGeom prst="rect">
+            <a:avLst/>
+          </a:prstGeom>
+          <a:noFill/>
+        </p:spPr>
+        <p:txBody>
+          <a:bodyPr wrap="square" rtlCol="0">
+            <a:spAutoFit/>
+          </a:bodyPr>
+          <a:lstStyle/>
+          <a:p>
+            <a:r>
+              <a:rPr lang="en-US" altLang="zh-TW" dirty="0"/>
+              <a:t>P.S. The seed is like a random table. We can think of different seeds as different random tables.</a:t>
+            </a:r>
+            <a:endParaRPr lang="zh-TW" altLang="en-US" dirty="0"/>
+          </a:p>
+        </p:txBody>
+      </p:sp>
     </p:spTree>
     <p:extLst>
       <p:ext uri="{BB962C8B-B14F-4D97-AF65-F5344CB8AC3E}">
@@ -7828,7 +7864,7 @@
         </p:nvSpPr>
         <p:spPr>
           <a:xfrm>
-            <a:off x="685801" y="1895399"/>
+            <a:off x="685801" y="1666799"/>
             <a:ext cx="8277837" cy="2031325"/>
           </a:xfrm>
           <a:prstGeom prst="rect">
@@ -8295,14 +8331,14 @@
           <p:nvPr>
             <p:extLst>
               <p:ext uri="{D42A27DB-BD31-4B8C-83A1-F6EECF244321}">
-                <p14:modId xmlns:p14="http://schemas.microsoft.com/office/powerpoint/2010/main" val="2210991588"/>
+                <p14:modId xmlns:p14="http://schemas.microsoft.com/office/powerpoint/2010/main" val="3404584559"/>
               </p:ext>
             </p:extLst>
           </p:nvPr>
         </p:nvGraphicFramePr>
         <p:xfrm>
-          <a:off x="755008" y="5005588"/>
-          <a:ext cx="5134065" cy="1483360"/>
+          <a:off x="731234" y="4501021"/>
+          <a:ext cx="5140968" cy="1483360"/>
         </p:xfrm>
         <a:graphic>
           <a:graphicData uri="http://schemas.openxmlformats.org/drawingml/2006/table">
@@ -8311,35 +8347,42 @@
                 <a:tableStyleId>{21E4AEA4-8DFA-4A89-87EB-49C32662AFE0}</a:tableStyleId>
               </a:tblPr>
               <a:tblGrid>
-                <a:gridCol w="1026813">
+                <a:gridCol w="856828">
+                  <a:extLst>
+                    <a:ext uri="{9D8B030D-6E8A-4147-A177-3AD203B41FA5}">
+                      <a16:colId xmlns:a16="http://schemas.microsoft.com/office/drawing/2014/main" val="69460370"/>
+                    </a:ext>
+                  </a:extLst>
+                </a:gridCol>
+                <a:gridCol w="856828">
                   <a:extLst>
                     <a:ext uri="{9D8B030D-6E8A-4147-A177-3AD203B41FA5}">
                       <a16:colId xmlns:a16="http://schemas.microsoft.com/office/drawing/2014/main" val="109659112"/>
                     </a:ext>
                   </a:extLst>
                 </a:gridCol>
-                <a:gridCol w="1026813">
+                <a:gridCol w="856828">
                   <a:extLst>
                     <a:ext uri="{9D8B030D-6E8A-4147-A177-3AD203B41FA5}">
                       <a16:colId xmlns:a16="http://schemas.microsoft.com/office/drawing/2014/main" val="3405095176"/>
                     </a:ext>
                   </a:extLst>
                 </a:gridCol>
-                <a:gridCol w="1026813">
+                <a:gridCol w="856828">
                   <a:extLst>
                     <a:ext uri="{9D8B030D-6E8A-4147-A177-3AD203B41FA5}">
                       <a16:colId xmlns:a16="http://schemas.microsoft.com/office/drawing/2014/main" val="1822018940"/>
                     </a:ext>
                   </a:extLst>
                 </a:gridCol>
-                <a:gridCol w="1026813">
+                <a:gridCol w="856828">
                   <a:extLst>
                     <a:ext uri="{9D8B030D-6E8A-4147-A177-3AD203B41FA5}">
                       <a16:colId xmlns:a16="http://schemas.microsoft.com/office/drawing/2014/main" val="1407225849"/>
                     </a:ext>
                   </a:extLst>
                 </a:gridCol>
-                <a:gridCol w="1026813">
+                <a:gridCol w="856828">
                   <a:extLst>
                     <a:ext uri="{9D8B030D-6E8A-4147-A177-3AD203B41FA5}">
                       <a16:colId xmlns:a16="http://schemas.microsoft.com/office/drawing/2014/main" val="2385728985"/>
@@ -8348,6 +8391,21 @@
                 </a:gridCol>
               </a:tblGrid>
               <a:tr h="370840">
+                <a:tc>
+                  <a:txBody>
+                    <a:bodyPr/>
+                    <a:lstStyle/>
+                    <a:p>
+                      <a:pPr algn="ctr"/>
+                      <a:r>
+                        <a:rPr lang="en-US" altLang="zh-TW" dirty="0"/>
+                        <a:t>s</a:t>
+                      </a:r>
+                      <a:endParaRPr lang="zh-TW" altLang="en-US" dirty="0"/>
+                    </a:p>
+                  </a:txBody>
+                  <a:tcPr/>
+                </a:tc>
                 <a:tc>
                   <a:txBody>
                     <a:bodyPr/>
@@ -8430,6 +8488,21 @@
                 </a:extLst>
               </a:tr>
               <a:tr h="370840">
+                <a:tc rowSpan="3">
+                  <a:txBody>
+                    <a:bodyPr/>
+                    <a:lstStyle/>
+                    <a:p>
+                      <a:pPr algn="ctr"/>
+                      <a:r>
+                        <a:rPr lang="en-US" altLang="zh-TW" dirty="0"/>
+                        <a:t>r</a:t>
+                      </a:r>
+                      <a:endParaRPr lang="zh-TW" altLang="en-US" dirty="0"/>
+                    </a:p>
+                  </a:txBody>
+                  <a:tcPr anchor="ctr"/>
+                </a:tc>
                 <a:tc>
                   <a:txBody>
                     <a:bodyPr/>
@@ -8512,6 +8585,17 @@
                 </a:extLst>
               </a:tr>
               <a:tr h="370840">
+                <a:tc vMerge="1">
+                  <a:txBody>
+                    <a:bodyPr/>
+                    <a:lstStyle/>
+                    <a:p>
+                      <a:pPr algn="ctr"/>
+                      <a:endParaRPr lang="zh-TW" altLang="en-US" dirty="0"/>
+                    </a:p>
+                  </a:txBody>
+                  <a:tcPr/>
+                </a:tc>
                 <a:tc>
                   <a:txBody>
                     <a:bodyPr/>
@@ -8594,6 +8678,17 @@
                 </a:extLst>
               </a:tr>
               <a:tr h="370840">
+                <a:tc vMerge="1">
+                  <a:txBody>
+                    <a:bodyPr/>
+                    <a:lstStyle/>
+                    <a:p>
+                      <a:pPr algn="ctr"/>
+                      <a:endParaRPr lang="zh-TW" altLang="en-US" dirty="0"/>
+                    </a:p>
+                  </a:txBody>
+                  <a:tcPr/>
+                </a:tc>
                 <a:tc>
                   <a:txBody>
                     <a:bodyPr/>
@@ -8681,7 +8776,7 @@
         </p:nvSpPr>
         <p:spPr>
           <a:xfrm>
-            <a:off x="731234" y="4089124"/>
+            <a:off x="731234" y="3670024"/>
             <a:ext cx="2743201" cy="461665"/>
           </a:xfrm>
           <a:prstGeom prst="rect">
@@ -8717,7 +8812,7 @@
         </p:nvSpPr>
         <p:spPr>
           <a:xfrm>
-            <a:off x="6519644" y="4089124"/>
+            <a:off x="6519644" y="3670024"/>
             <a:ext cx="3354199" cy="830997"/>
           </a:xfrm>
           <a:prstGeom prst="rect">
@@ -8760,14 +8855,14 @@
           <p:nvPr>
             <p:extLst>
               <p:ext uri="{D42A27DB-BD31-4B8C-83A1-F6EECF244321}">
-                <p14:modId xmlns:p14="http://schemas.microsoft.com/office/powerpoint/2010/main" val="4152151837"/>
+                <p14:modId xmlns:p14="http://schemas.microsoft.com/office/powerpoint/2010/main" val="461933414"/>
               </p:ext>
             </p:extLst>
           </p:nvPr>
         </p:nvGraphicFramePr>
         <p:xfrm>
-          <a:off x="6611922" y="5005588"/>
-          <a:ext cx="5134065" cy="1752600"/>
+          <a:off x="6519644" y="4501021"/>
+          <a:ext cx="5134068" cy="1752600"/>
         </p:xfrm>
         <a:graphic>
           <a:graphicData uri="http://schemas.openxmlformats.org/drawingml/2006/table">
@@ -8776,35 +8871,42 @@
                 <a:tableStyleId>{21E4AEA4-8DFA-4A89-87EB-49C32662AFE0}</a:tableStyleId>
               </a:tblPr>
               <a:tblGrid>
-                <a:gridCol w="1026813">
+                <a:gridCol w="855678">
+                  <a:extLst>
+                    <a:ext uri="{9D8B030D-6E8A-4147-A177-3AD203B41FA5}">
+                      <a16:colId xmlns:a16="http://schemas.microsoft.com/office/drawing/2014/main" val="1160444385"/>
+                    </a:ext>
+                  </a:extLst>
+                </a:gridCol>
+                <a:gridCol w="855678">
                   <a:extLst>
                     <a:ext uri="{9D8B030D-6E8A-4147-A177-3AD203B41FA5}">
                       <a16:colId xmlns:a16="http://schemas.microsoft.com/office/drawing/2014/main" val="109659112"/>
                     </a:ext>
                   </a:extLst>
                 </a:gridCol>
-                <a:gridCol w="1026813">
+                <a:gridCol w="855678">
                   <a:extLst>
                     <a:ext uri="{9D8B030D-6E8A-4147-A177-3AD203B41FA5}">
                       <a16:colId xmlns:a16="http://schemas.microsoft.com/office/drawing/2014/main" val="3405095176"/>
                     </a:ext>
                   </a:extLst>
                 </a:gridCol>
-                <a:gridCol w="1026813">
+                <a:gridCol w="855678">
                   <a:extLst>
                     <a:ext uri="{9D8B030D-6E8A-4147-A177-3AD203B41FA5}">
                       <a16:colId xmlns:a16="http://schemas.microsoft.com/office/drawing/2014/main" val="1822018940"/>
                     </a:ext>
                   </a:extLst>
                 </a:gridCol>
-                <a:gridCol w="1026813">
+                <a:gridCol w="855678">
                   <a:extLst>
                     <a:ext uri="{9D8B030D-6E8A-4147-A177-3AD203B41FA5}">
                       <a16:colId xmlns:a16="http://schemas.microsoft.com/office/drawing/2014/main" val="1407225849"/>
                     </a:ext>
                   </a:extLst>
                 </a:gridCol>
-                <a:gridCol w="1026813">
+                <a:gridCol w="855678">
                   <a:extLst>
                     <a:ext uri="{9D8B030D-6E8A-4147-A177-3AD203B41FA5}">
                       <a16:colId xmlns:a16="http://schemas.microsoft.com/office/drawing/2014/main" val="2385728985"/>
@@ -8813,6 +8915,21 @@
                 </a:gridCol>
               </a:tblGrid>
               <a:tr h="370840">
+                <a:tc>
+                  <a:txBody>
+                    <a:bodyPr/>
+                    <a:lstStyle/>
+                    <a:p>
+                      <a:pPr algn="ctr"/>
+                      <a:r>
+                        <a:rPr lang="en-US" altLang="zh-TW" dirty="0"/>
+                        <a:t>s</a:t>
+                      </a:r>
+                      <a:endParaRPr lang="zh-TW" altLang="en-US" dirty="0"/>
+                    </a:p>
+                  </a:txBody>
+                  <a:tcPr/>
+                </a:tc>
                 <a:tc>
                   <a:txBody>
                     <a:bodyPr/>
@@ -8895,6 +9012,21 @@
                 </a:extLst>
               </a:tr>
               <a:tr h="370840">
+                <a:tc rowSpan="3">
+                  <a:txBody>
+                    <a:bodyPr/>
+                    <a:lstStyle/>
+                    <a:p>
+                      <a:pPr algn="ctr"/>
+                      <a:r>
+                        <a:rPr lang="en-US" altLang="zh-TW" dirty="0"/>
+                        <a:t>r</a:t>
+                      </a:r>
+                      <a:endParaRPr lang="zh-TW" altLang="en-US" dirty="0"/>
+                    </a:p>
+                  </a:txBody>
+                  <a:tcPr anchor="ctr"/>
+                </a:tc>
                 <a:tc>
                   <a:txBody>
                     <a:bodyPr/>
@@ -8977,6 +9109,17 @@
                 </a:extLst>
               </a:tr>
               <a:tr h="370840">
+                <a:tc vMerge="1">
+                  <a:txBody>
+                    <a:bodyPr/>
+                    <a:lstStyle/>
+                    <a:p>
+                      <a:pPr algn="ctr"/>
+                      <a:endParaRPr lang="zh-TW" altLang="en-US" dirty="0"/>
+                    </a:p>
+                  </a:txBody>
+                  <a:tcPr/>
+                </a:tc>
                 <a:tc>
                   <a:txBody>
                     <a:bodyPr/>
@@ -9059,6 +9202,17 @@
                 </a:extLst>
               </a:tr>
               <a:tr h="370840">
+                <a:tc vMerge="1">
+                  <a:txBody>
+                    <a:bodyPr/>
+                    <a:lstStyle/>
+                    <a:p>
+                      <a:pPr algn="ctr"/>
+                      <a:endParaRPr lang="zh-TW" altLang="en-US" dirty="0"/>
+                    </a:p>
+                  </a:txBody>
+                  <a:tcPr/>
+                </a:tc>
                 <a:tc>
                   <a:txBody>
                     <a:bodyPr/>
@@ -9154,6 +9308,42 @@
           </a:graphicData>
         </a:graphic>
       </p:graphicFrame>
+      <p:sp>
+        <p:nvSpPr>
+          <p:cNvPr id="3" name="文字方塊 2">
+            <a:extLst>
+              <a:ext uri="{FF2B5EF4-FFF2-40B4-BE49-F238E27FC236}">
+                <a16:creationId xmlns:a16="http://schemas.microsoft.com/office/drawing/2014/main" id="{DF1EE152-B321-A46B-A720-74216B8D39D3}"/>
+              </a:ext>
+            </a:extLst>
+          </p:cNvPr>
+          <p:cNvSpPr txBox="1"/>
+          <p:nvPr/>
+        </p:nvSpPr>
+        <p:spPr>
+          <a:xfrm>
+            <a:off x="819150" y="6253621"/>
+            <a:ext cx="10963275" cy="369332"/>
+          </a:xfrm>
+          <a:prstGeom prst="rect">
+            <a:avLst/>
+          </a:prstGeom>
+          <a:noFill/>
+        </p:spPr>
+        <p:txBody>
+          <a:bodyPr wrap="square" rtlCol="0">
+            <a:spAutoFit/>
+          </a:bodyPr>
+          <a:lstStyle/>
+          <a:p>
+            <a:r>
+              <a:rPr lang="en-US" altLang="zh-TW" dirty="0"/>
+              <a:t>P.S.  Because we want the same probability of 10-14, we discard r when r is equal to 10 or 11.</a:t>
+            </a:r>
+            <a:endParaRPr lang="zh-TW" altLang="en-US" dirty="0"/>
+          </a:p>
+        </p:txBody>
+      </p:sp>
     </p:spTree>
     <p:extLst>
       <p:ext uri="{BB962C8B-B14F-4D97-AF65-F5344CB8AC3E}">
@@ -11167,8 +11357,8 @@
         </p:nvSpPr>
         <p:spPr>
           <a:xfrm>
-            <a:off x="593508" y="2018916"/>
-            <a:ext cx="5413010" cy="1754326"/>
+            <a:off x="593508" y="1713194"/>
+            <a:ext cx="5413010" cy="2308324"/>
           </a:xfrm>
           <a:prstGeom prst="rect">
             <a:avLst/>
@@ -11187,6 +11377,15 @@
           <a:lstStyle/>
           <a:p>
             <a:r>
+              <a:rPr lang="en-US" altLang="zh-TW" b="1" dirty="0"/>
+              <a:t>Using these commands on Linux</a:t>
+            </a:r>
+          </a:p>
+          <a:p>
+            <a:endParaRPr lang="en-US" altLang="zh-TW" dirty="0"/>
+          </a:p>
+          <a:p>
+            <a:r>
               <a:rPr lang="en-US" altLang="zh-TW" dirty="0" err="1"/>
               <a:t>sudo</a:t>
             </a:r>
@@ -11267,7 +11466,7 @@
         <p:spPr>
           <a:xfrm>
             <a:off x="593508" y="4191969"/>
-            <a:ext cx="6797193" cy="1477328"/>
+            <a:ext cx="6797193" cy="2031325"/>
           </a:xfrm>
           <a:prstGeom prst="rect">
             <a:avLst/>
@@ -11284,6 +11483,15 @@
             <a:spAutoFit/>
           </a:bodyPr>
           <a:lstStyle/>
+          <a:p>
+            <a:r>
+              <a:rPr lang="en-US" altLang="zh-TW" b="1" dirty="0"/>
+              <a:t>Using these commands with MinGW on Windows</a:t>
+            </a:r>
+          </a:p>
+          <a:p>
+            <a:endParaRPr lang="en-US" altLang="zh-TW" dirty="0"/>
+          </a:p>
           <a:p>
             <a:r>
               <a:rPr lang="en-US" altLang="zh-TW" dirty="0"/>

</xml_diff>

<commit_message>
Revise mistakes on lab04-ppt
</commit_message>
<xml_diff>
--- a/lab04-googletest/00-lab04.pptx
+++ b/lab04-googletest/00-lab04.pptx
@@ -357,7 +357,7 @@
             <a:fld id="{B61BEF0D-F0BB-DE4B-95CE-6DB70DBA9567}" type="datetimeFigureOut">
               <a:rPr lang="en-US" dirty="0"/>
               <a:pPr/>
-              <a:t>12/6/2021</a:t>
+              <a:t>5/13/2022</a:t>
             </a:fld>
             <a:endParaRPr lang="en-US" dirty="0"/>
           </a:p>
@@ -688,7 +688,7 @@
             <a:fld id="{B61BEF0D-F0BB-DE4B-95CE-6DB70DBA9567}" type="datetimeFigureOut">
               <a:rPr lang="en-US" dirty="0"/>
               <a:pPr/>
-              <a:t>12/6/2021</a:t>
+              <a:t>5/13/2022</a:t>
             </a:fld>
             <a:endParaRPr lang="en-US" dirty="0"/>
           </a:p>
@@ -963,7 +963,7 @@
             <a:fld id="{B61BEF0D-F0BB-DE4B-95CE-6DB70DBA9567}" type="datetimeFigureOut">
               <a:rPr lang="en-US" dirty="0"/>
               <a:pPr/>
-              <a:t>12/6/2021</a:t>
+              <a:t>5/13/2022</a:t>
             </a:fld>
             <a:endParaRPr lang="en-US" dirty="0"/>
           </a:p>
@@ -1528,7 +1528,7 @@
             <a:fld id="{B61BEF0D-F0BB-DE4B-95CE-6DB70DBA9567}" type="datetimeFigureOut">
               <a:rPr lang="en-US" dirty="0"/>
               <a:pPr/>
-              <a:t>12/6/2021</a:t>
+              <a:t>5/13/2022</a:t>
             </a:fld>
             <a:endParaRPr lang="en-US" dirty="0"/>
           </a:p>
@@ -1803,7 +1803,7 @@
             <a:fld id="{B61BEF0D-F0BB-DE4B-95CE-6DB70DBA9567}" type="datetimeFigureOut">
               <a:rPr lang="en-US" dirty="0"/>
               <a:pPr/>
-              <a:t>12/6/2021</a:t>
+              <a:t>5/13/2022</a:t>
             </a:fld>
             <a:endParaRPr lang="en-US" dirty="0"/>
           </a:p>
@@ -2362,7 +2362,7 @@
             <a:fld id="{B61BEF0D-F0BB-DE4B-95CE-6DB70DBA9567}" type="datetimeFigureOut">
               <a:rPr lang="en-US" dirty="0"/>
               <a:pPr/>
-              <a:t>12/6/2021</a:t>
+              <a:t>5/13/2022</a:t>
             </a:fld>
             <a:endParaRPr lang="en-US" dirty="0"/>
           </a:p>
@@ -2686,7 +2686,7 @@
             <a:fld id="{B61BEF0D-F0BB-DE4B-95CE-6DB70DBA9567}" type="datetimeFigureOut">
               <a:rPr lang="en-US" dirty="0"/>
               <a:pPr/>
-              <a:t>12/6/2021</a:t>
+              <a:t>5/13/2022</a:t>
             </a:fld>
             <a:endParaRPr lang="en-US" dirty="0"/>
           </a:p>
@@ -2860,7 +2860,7 @@
             <a:fld id="{B61BEF0D-F0BB-DE4B-95CE-6DB70DBA9567}" type="datetimeFigureOut">
               <a:rPr lang="en-US" dirty="0"/>
               <a:pPr/>
-              <a:t>12/6/2021</a:t>
+              <a:t>5/13/2022</a:t>
             </a:fld>
             <a:endParaRPr lang="en-US" dirty="0"/>
           </a:p>
@@ -3095,7 +3095,7 @@
             <a:fld id="{B61BEF0D-F0BB-DE4B-95CE-6DB70DBA9567}" type="datetimeFigureOut">
               <a:rPr lang="en-US" dirty="0"/>
               <a:pPr/>
-              <a:t>12/6/2021</a:t>
+              <a:t>5/13/2022</a:t>
             </a:fld>
             <a:endParaRPr lang="en-US" dirty="0"/>
           </a:p>
@@ -3292,7 +3292,7 @@
             <a:fld id="{B61BEF0D-F0BB-DE4B-95CE-6DB70DBA9567}" type="datetimeFigureOut">
               <a:rPr lang="en-US" dirty="0"/>
               <a:pPr/>
-              <a:t>12/6/2021</a:t>
+              <a:t>5/13/2022</a:t>
             </a:fld>
             <a:endParaRPr lang="en-US" dirty="0"/>
           </a:p>
@@ -3565,7 +3565,7 @@
             <a:fld id="{B61BEF0D-F0BB-DE4B-95CE-6DB70DBA9567}" type="datetimeFigureOut">
               <a:rPr lang="en-US" dirty="0"/>
               <a:pPr/>
-              <a:t>12/6/2021</a:t>
+              <a:t>5/13/2022</a:t>
             </a:fld>
             <a:endParaRPr lang="en-US" dirty="0"/>
           </a:p>
@@ -3828,7 +3828,7 @@
             <a:fld id="{B61BEF0D-F0BB-DE4B-95CE-6DB70DBA9567}" type="datetimeFigureOut">
               <a:rPr lang="en-US" dirty="0"/>
               <a:pPr/>
-              <a:t>12/6/2021</a:t>
+              <a:t>5/13/2022</a:t>
             </a:fld>
             <a:endParaRPr lang="en-US" dirty="0"/>
           </a:p>
@@ -4199,7 +4199,7 @@
             <a:fld id="{B61BEF0D-F0BB-DE4B-95CE-6DB70DBA9567}" type="datetimeFigureOut">
               <a:rPr lang="en-US" dirty="0"/>
               <a:pPr/>
-              <a:t>12/6/2021</a:t>
+              <a:t>5/13/2022</a:t>
             </a:fld>
             <a:endParaRPr lang="en-US" dirty="0"/>
           </a:p>
@@ -4344,7 +4344,7 @@
             <a:fld id="{B61BEF0D-F0BB-DE4B-95CE-6DB70DBA9567}" type="datetimeFigureOut">
               <a:rPr lang="en-US" dirty="0"/>
               <a:pPr/>
-              <a:t>12/6/2021</a:t>
+              <a:t>5/13/2022</a:t>
             </a:fld>
             <a:endParaRPr lang="en-US" dirty="0"/>
           </a:p>
@@ -4466,7 +4466,7 @@
             <a:fld id="{B61BEF0D-F0BB-DE4B-95CE-6DB70DBA9567}" type="datetimeFigureOut">
               <a:rPr lang="en-US" dirty="0"/>
               <a:pPr/>
-              <a:t>12/6/2021</a:t>
+              <a:t>5/13/2022</a:t>
             </a:fld>
             <a:endParaRPr lang="en-US" dirty="0"/>
           </a:p>
@@ -4748,7 +4748,7 @@
             <a:fld id="{B61BEF0D-F0BB-DE4B-95CE-6DB70DBA9567}" type="datetimeFigureOut">
               <a:rPr lang="en-US" dirty="0"/>
               <a:pPr/>
-              <a:t>12/6/2021</a:t>
+              <a:t>5/13/2022</a:t>
             </a:fld>
             <a:endParaRPr lang="en-US" dirty="0"/>
           </a:p>
@@ -5069,7 +5069,7 @@
             <a:fld id="{B61BEF0D-F0BB-DE4B-95CE-6DB70DBA9567}" type="datetimeFigureOut">
               <a:rPr lang="en-US" dirty="0"/>
               <a:pPr/>
-              <a:t>12/6/2021</a:t>
+              <a:t>5/13/2022</a:t>
             </a:fld>
             <a:endParaRPr lang="en-US" dirty="0"/>
           </a:p>
@@ -5280,7 +5280,7 @@
             <a:fld id="{B61BEF0D-F0BB-DE4B-95CE-6DB70DBA9567}" type="datetimeFigureOut">
               <a:rPr lang="en-US" dirty="0"/>
               <a:pPr/>
-              <a:t>12/6/2021</a:t>
+              <a:t>5/13/2022</a:t>
             </a:fld>
             <a:endParaRPr lang="en-US" dirty="0"/>
           </a:p>
@@ -6073,7 +6073,7 @@
           <a:p>
             <a:r>
               <a:rPr lang="en-US" altLang="zh-TW" dirty="0"/>
-              <a:t>EXCEPT will continue the testing and generate non-fatal failures when errors are detected</a:t>
+              <a:t>EXPECT will continue the testing and generate non-fatal failures when errors are detected</a:t>
             </a:r>
             <a:endParaRPr lang="zh-TW" altLang="en-US" dirty="0"/>
           </a:p>
@@ -8292,7 +8292,13 @@
           <p:cNvGraphicFramePr>
             <a:graphicFrameLocks noGrp="1"/>
           </p:cNvGraphicFramePr>
-          <p:nvPr/>
+          <p:nvPr>
+            <p:extLst>
+              <p:ext uri="{D42A27DB-BD31-4B8C-83A1-F6EECF244321}">
+                <p14:modId xmlns:p14="http://schemas.microsoft.com/office/powerpoint/2010/main" val="1097976884"/>
+              </p:ext>
+            </p:extLst>
+          </p:nvPr>
         </p:nvGraphicFramePr>
         <p:xfrm>
           <a:off x="755008" y="5005588"/>
@@ -8477,6 +8483,21 @@
                       <a:pPr algn="ctr"/>
                       <a:r>
                         <a:rPr lang="en-US" altLang="zh-TW" dirty="0"/>
+                        <a:t>3</a:t>
+                      </a:r>
+                      <a:endParaRPr lang="zh-TW" altLang="en-US" dirty="0"/>
+                    </a:p>
+                  </a:txBody>
+                  <a:tcPr/>
+                </a:tc>
+                <a:tc>
+                  <a:txBody>
+                    <a:bodyPr/>
+                    <a:lstStyle/>
+                    <a:p>
+                      <a:pPr algn="ctr"/>
+                      <a:r>
+                        <a:rPr lang="en-US" altLang="zh-TW" dirty="0"/>
                         <a:t>4</a:t>
                       </a:r>
                       <a:endParaRPr lang="zh-TW" altLang="en-US" dirty="0"/>
@@ -8484,6 +8505,13 @@
                   </a:txBody>
                   <a:tcPr/>
                 </a:tc>
+                <a:extLst>
+                  <a:ext uri="{0D108BD9-81ED-4DB2-BD59-A6C34878D82A}">
+                    <a16:rowId xmlns:a16="http://schemas.microsoft.com/office/drawing/2014/main" val="1838442169"/>
+                  </a:ext>
+                </a:extLst>
+              </a:tr>
+              <a:tr h="370840">
                 <a:tc>
                   <a:txBody>
                     <a:bodyPr/>
@@ -8499,13 +8527,6 @@
                   </a:txBody>
                   <a:tcPr/>
                 </a:tc>
-                <a:extLst>
-                  <a:ext uri="{0D108BD9-81ED-4DB2-BD59-A6C34878D82A}">
-                    <a16:rowId xmlns:a16="http://schemas.microsoft.com/office/drawing/2014/main" val="1838442169"/>
-                  </a:ext>
-                </a:extLst>
-              </a:tr>
-              <a:tr h="370840">
                 <a:tc>
                   <a:txBody>
                     <a:bodyPr/>
@@ -8566,6 +8587,13 @@
                   </a:txBody>
                   <a:tcPr/>
                 </a:tc>
+                <a:extLst>
+                  <a:ext uri="{0D108BD9-81ED-4DB2-BD59-A6C34878D82A}">
+                    <a16:rowId xmlns:a16="http://schemas.microsoft.com/office/drawing/2014/main" val="2666442926"/>
+                  </a:ext>
+                </a:extLst>
+              </a:tr>
+              <a:tr h="370840">
                 <a:tc>
                   <a:txBody>
                     <a:bodyPr/>
@@ -8581,13 +8609,6 @@
                   </a:txBody>
                   <a:tcPr/>
                 </a:tc>
-                <a:extLst>
-                  <a:ext uri="{0D108BD9-81ED-4DB2-BD59-A6C34878D82A}">
-                    <a16:rowId xmlns:a16="http://schemas.microsoft.com/office/drawing/2014/main" val="2666442926"/>
-                  </a:ext>
-                </a:extLst>
-              </a:tr>
-              <a:tr h="370840">
                 <a:tc>
                   <a:txBody>
                     <a:bodyPr/>
@@ -8597,21 +8618,6 @@
                       <a:r>
                         <a:rPr lang="en-US" altLang="zh-TW" dirty="0"/>
                         <a:t>11</a:t>
-                      </a:r>
-                      <a:endParaRPr lang="zh-TW" altLang="en-US" dirty="0"/>
-                    </a:p>
-                  </a:txBody>
-                  <a:tcPr/>
-                </a:tc>
-                <a:tc>
-                  <a:txBody>
-                    <a:bodyPr/>
-                    <a:lstStyle/>
-                    <a:p>
-                      <a:pPr algn="ctr"/>
-                      <a:r>
-                        <a:rPr lang="en-US" altLang="zh-TW" dirty="0"/>
-                        <a:t>12</a:t>
                       </a:r>
                       <a:endParaRPr lang="zh-TW" altLang="en-US" dirty="0"/>
                     </a:p>
@@ -8751,7 +8757,13 @@
           <p:cNvGraphicFramePr>
             <a:graphicFrameLocks noGrp="1"/>
           </p:cNvGraphicFramePr>
-          <p:nvPr/>
+          <p:nvPr>
+            <p:extLst>
+              <p:ext uri="{D42A27DB-BD31-4B8C-83A1-F6EECF244321}">
+                <p14:modId xmlns:p14="http://schemas.microsoft.com/office/powerpoint/2010/main" val="3100032204"/>
+              </p:ext>
+            </p:extLst>
+          </p:nvPr>
         </p:nvGraphicFramePr>
         <p:xfrm>
           <a:off x="6611922" y="5005588"/>
@@ -8936,6 +8948,21 @@
                       <a:pPr algn="ctr"/>
                       <a:r>
                         <a:rPr lang="en-US" altLang="zh-TW" dirty="0"/>
+                        <a:t>3</a:t>
+                      </a:r>
+                      <a:endParaRPr lang="zh-TW" altLang="en-US" dirty="0"/>
+                    </a:p>
+                  </a:txBody>
+                  <a:tcPr/>
+                </a:tc>
+                <a:tc>
+                  <a:txBody>
+                    <a:bodyPr/>
+                    <a:lstStyle/>
+                    <a:p>
+                      <a:pPr algn="ctr"/>
+                      <a:r>
+                        <a:rPr lang="en-US" altLang="zh-TW" dirty="0"/>
                         <a:t>4</a:t>
                       </a:r>
                       <a:endParaRPr lang="zh-TW" altLang="en-US" dirty="0"/>
@@ -8943,6 +8970,13 @@
                   </a:txBody>
                   <a:tcPr/>
                 </a:tc>
+                <a:extLst>
+                  <a:ext uri="{0D108BD9-81ED-4DB2-BD59-A6C34878D82A}">
+                    <a16:rowId xmlns:a16="http://schemas.microsoft.com/office/drawing/2014/main" val="1838442169"/>
+                  </a:ext>
+                </a:extLst>
+              </a:tr>
+              <a:tr h="370840">
                 <a:tc>
                   <a:txBody>
                     <a:bodyPr/>
@@ -8958,13 +8992,6 @@
                   </a:txBody>
                   <a:tcPr/>
                 </a:tc>
-                <a:extLst>
-                  <a:ext uri="{0D108BD9-81ED-4DB2-BD59-A6C34878D82A}">
-                    <a16:rowId xmlns:a16="http://schemas.microsoft.com/office/drawing/2014/main" val="1838442169"/>
-                  </a:ext>
-                </a:extLst>
-              </a:tr>
-              <a:tr h="370840">
                 <a:tc>
                   <a:txBody>
                     <a:bodyPr/>
@@ -9025,21 +9052,6 @@
                   </a:txBody>
                   <a:tcPr/>
                 </a:tc>
-                <a:tc>
-                  <a:txBody>
-                    <a:bodyPr/>
-                    <a:lstStyle/>
-                    <a:p>
-                      <a:pPr algn="ctr"/>
-                      <a:r>
-                        <a:rPr lang="en-US" altLang="zh-TW" dirty="0"/>
-                        <a:t>10</a:t>
-                      </a:r>
-                      <a:endParaRPr lang="zh-TW" altLang="en-US" dirty="0"/>
-                    </a:p>
-                  </a:txBody>
-                  <a:tcPr/>
-                </a:tc>
                 <a:extLst>
                   <a:ext uri="{0D108BD9-81ED-4DB2-BD59-A6C34878D82A}">
                     <a16:rowId xmlns:a16="http://schemas.microsoft.com/office/drawing/2014/main" val="2666442926"/>
@@ -9059,7 +9071,7 @@
                             <a:srgbClr val="FF0000"/>
                           </a:solidFill>
                         </a:rPr>
-                        <a:t>11</a:t>
+                        <a:t>10</a:t>
                       </a:r>
                       <a:br>
                         <a:rPr lang="en-US" altLang="zh-TW" dirty="0"/>
@@ -9085,7 +9097,7 @@
                             <a:srgbClr val="FF0000"/>
                           </a:solidFill>
                         </a:rPr>
-                        <a:t>12</a:t>
+                        <a:t>11</a:t>
                       </a:r>
                     </a:p>
                     <a:p>
@@ -11424,7 +11436,7 @@
           <a:p>
             <a:r>
               <a:rPr lang="en-US" altLang="zh-TW" dirty="0"/>
-              <a:t>INSTALL GOOGLETEST in code-server</a:t>
+              <a:t>INSTALL GOOGLETEST On code-server</a:t>
             </a:r>
             <a:endParaRPr lang="zh-TW" altLang="en-US" dirty="0"/>
           </a:p>
@@ -11462,13 +11474,13 @@
             </a:r>
             <a:r>
               <a:rPr lang="en-US" altLang="zh-TW" dirty="0"/>
-              <a:t> have been installed in code-server</a:t>
+              <a:t> has been installed on code-server</a:t>
             </a:r>
           </a:p>
           <a:p>
             <a:r>
               <a:rPr lang="en-US" altLang="zh-TW" dirty="0"/>
-              <a:t>All files can be found in folder `/shared/`</a:t>
+              <a:t>All files can be found in the folder `/shared/`</a:t>
             </a:r>
             <a:endParaRPr lang="zh-TW" altLang="en-US" dirty="0"/>
           </a:p>
@@ -12125,13 +12137,13 @@
           <a:p>
             <a:r>
               <a:rPr lang="en-US" altLang="zh-TW" dirty="0"/>
-              <a:t>Use default configuration.</a:t>
+              <a:t>Use default configurations.</a:t>
             </a:r>
           </a:p>
           <a:p>
             <a:r>
               <a:rPr lang="en-US" altLang="zh-TW" dirty="0"/>
-              <a:t>You can copy file from `</a:t>
+              <a:t>You can copy the file from `</a:t>
             </a:r>
             <a:r>
               <a:rPr lang="en-US" altLang="zh-TW" dirty="0" err="1"/>

</xml_diff>

<commit_message>
Add context on lab04-ppt
</commit_message>
<xml_diff>
--- a/lab04-googletest/00-lab04.pptx
+++ b/lab04-googletest/00-lab04.pptx
@@ -357,7 +357,7 @@
             <a:fld id="{B61BEF0D-F0BB-DE4B-95CE-6DB70DBA9567}" type="datetimeFigureOut">
               <a:rPr lang="en-US" dirty="0"/>
               <a:pPr/>
-              <a:t>5/13/2022</a:t>
+              <a:t>5/16/2022</a:t>
             </a:fld>
             <a:endParaRPr lang="en-US" dirty="0"/>
           </a:p>
@@ -688,7 +688,7 @@
             <a:fld id="{B61BEF0D-F0BB-DE4B-95CE-6DB70DBA9567}" type="datetimeFigureOut">
               <a:rPr lang="en-US" dirty="0"/>
               <a:pPr/>
-              <a:t>5/13/2022</a:t>
+              <a:t>5/16/2022</a:t>
             </a:fld>
             <a:endParaRPr lang="en-US" dirty="0"/>
           </a:p>
@@ -963,7 +963,7 @@
             <a:fld id="{B61BEF0D-F0BB-DE4B-95CE-6DB70DBA9567}" type="datetimeFigureOut">
               <a:rPr lang="en-US" dirty="0"/>
               <a:pPr/>
-              <a:t>5/13/2022</a:t>
+              <a:t>5/16/2022</a:t>
             </a:fld>
             <a:endParaRPr lang="en-US" dirty="0"/>
           </a:p>
@@ -1528,7 +1528,7 @@
             <a:fld id="{B61BEF0D-F0BB-DE4B-95CE-6DB70DBA9567}" type="datetimeFigureOut">
               <a:rPr lang="en-US" dirty="0"/>
               <a:pPr/>
-              <a:t>5/13/2022</a:t>
+              <a:t>5/16/2022</a:t>
             </a:fld>
             <a:endParaRPr lang="en-US" dirty="0"/>
           </a:p>
@@ -1803,7 +1803,7 @@
             <a:fld id="{B61BEF0D-F0BB-DE4B-95CE-6DB70DBA9567}" type="datetimeFigureOut">
               <a:rPr lang="en-US" dirty="0"/>
               <a:pPr/>
-              <a:t>5/13/2022</a:t>
+              <a:t>5/16/2022</a:t>
             </a:fld>
             <a:endParaRPr lang="en-US" dirty="0"/>
           </a:p>
@@ -2362,7 +2362,7 @@
             <a:fld id="{B61BEF0D-F0BB-DE4B-95CE-6DB70DBA9567}" type="datetimeFigureOut">
               <a:rPr lang="en-US" dirty="0"/>
               <a:pPr/>
-              <a:t>5/13/2022</a:t>
+              <a:t>5/16/2022</a:t>
             </a:fld>
             <a:endParaRPr lang="en-US" dirty="0"/>
           </a:p>
@@ -2686,7 +2686,7 @@
             <a:fld id="{B61BEF0D-F0BB-DE4B-95CE-6DB70DBA9567}" type="datetimeFigureOut">
               <a:rPr lang="en-US" dirty="0"/>
               <a:pPr/>
-              <a:t>5/13/2022</a:t>
+              <a:t>5/16/2022</a:t>
             </a:fld>
             <a:endParaRPr lang="en-US" dirty="0"/>
           </a:p>
@@ -2860,7 +2860,7 @@
             <a:fld id="{B61BEF0D-F0BB-DE4B-95CE-6DB70DBA9567}" type="datetimeFigureOut">
               <a:rPr lang="en-US" dirty="0"/>
               <a:pPr/>
-              <a:t>5/13/2022</a:t>
+              <a:t>5/16/2022</a:t>
             </a:fld>
             <a:endParaRPr lang="en-US" dirty="0"/>
           </a:p>
@@ -3095,7 +3095,7 @@
             <a:fld id="{B61BEF0D-F0BB-DE4B-95CE-6DB70DBA9567}" type="datetimeFigureOut">
               <a:rPr lang="en-US" dirty="0"/>
               <a:pPr/>
-              <a:t>5/13/2022</a:t>
+              <a:t>5/16/2022</a:t>
             </a:fld>
             <a:endParaRPr lang="en-US" dirty="0"/>
           </a:p>
@@ -3292,7 +3292,7 @@
             <a:fld id="{B61BEF0D-F0BB-DE4B-95CE-6DB70DBA9567}" type="datetimeFigureOut">
               <a:rPr lang="en-US" dirty="0"/>
               <a:pPr/>
-              <a:t>5/13/2022</a:t>
+              <a:t>5/16/2022</a:t>
             </a:fld>
             <a:endParaRPr lang="en-US" dirty="0"/>
           </a:p>
@@ -3565,7 +3565,7 @@
             <a:fld id="{B61BEF0D-F0BB-DE4B-95CE-6DB70DBA9567}" type="datetimeFigureOut">
               <a:rPr lang="en-US" dirty="0"/>
               <a:pPr/>
-              <a:t>5/13/2022</a:t>
+              <a:t>5/16/2022</a:t>
             </a:fld>
             <a:endParaRPr lang="en-US" dirty="0"/>
           </a:p>
@@ -3828,7 +3828,7 @@
             <a:fld id="{B61BEF0D-F0BB-DE4B-95CE-6DB70DBA9567}" type="datetimeFigureOut">
               <a:rPr lang="en-US" dirty="0"/>
               <a:pPr/>
-              <a:t>5/13/2022</a:t>
+              <a:t>5/16/2022</a:t>
             </a:fld>
             <a:endParaRPr lang="en-US" dirty="0"/>
           </a:p>
@@ -4199,7 +4199,7 @@
             <a:fld id="{B61BEF0D-F0BB-DE4B-95CE-6DB70DBA9567}" type="datetimeFigureOut">
               <a:rPr lang="en-US" dirty="0"/>
               <a:pPr/>
-              <a:t>5/13/2022</a:t>
+              <a:t>5/16/2022</a:t>
             </a:fld>
             <a:endParaRPr lang="en-US" dirty="0"/>
           </a:p>
@@ -4344,7 +4344,7 @@
             <a:fld id="{B61BEF0D-F0BB-DE4B-95CE-6DB70DBA9567}" type="datetimeFigureOut">
               <a:rPr lang="en-US" dirty="0"/>
               <a:pPr/>
-              <a:t>5/13/2022</a:t>
+              <a:t>5/16/2022</a:t>
             </a:fld>
             <a:endParaRPr lang="en-US" dirty="0"/>
           </a:p>
@@ -4466,7 +4466,7 @@
             <a:fld id="{B61BEF0D-F0BB-DE4B-95CE-6DB70DBA9567}" type="datetimeFigureOut">
               <a:rPr lang="en-US" dirty="0"/>
               <a:pPr/>
-              <a:t>5/13/2022</a:t>
+              <a:t>5/16/2022</a:t>
             </a:fld>
             <a:endParaRPr lang="en-US" dirty="0"/>
           </a:p>
@@ -4748,7 +4748,7 @@
             <a:fld id="{B61BEF0D-F0BB-DE4B-95CE-6DB70DBA9567}" type="datetimeFigureOut">
               <a:rPr lang="en-US" dirty="0"/>
               <a:pPr/>
-              <a:t>5/13/2022</a:t>
+              <a:t>5/16/2022</a:t>
             </a:fld>
             <a:endParaRPr lang="en-US" dirty="0"/>
           </a:p>
@@ -5069,7 +5069,7 @@
             <a:fld id="{B61BEF0D-F0BB-DE4B-95CE-6DB70DBA9567}" type="datetimeFigureOut">
               <a:rPr lang="en-US" dirty="0"/>
               <a:pPr/>
-              <a:t>5/13/2022</a:t>
+              <a:t>5/16/2022</a:t>
             </a:fld>
             <a:endParaRPr lang="en-US" dirty="0"/>
           </a:p>
@@ -5280,7 +5280,7 @@
             <a:fld id="{B61BEF0D-F0BB-DE4B-95CE-6DB70DBA9567}" type="datetimeFigureOut">
               <a:rPr lang="en-US" dirty="0"/>
               <a:pPr/>
-              <a:t>5/13/2022</a:t>
+              <a:t>5/16/2022</a:t>
             </a:fld>
             <a:endParaRPr lang="en-US" dirty="0"/>
           </a:p>
@@ -7755,6 +7755,58 @@
           </a:ln>
         </p:spPr>
       </p:pic>
+      <p:sp>
+        <p:nvSpPr>
+          <p:cNvPr id="3" name="文字方塊 2">
+            <a:extLst>
+              <a:ext uri="{FF2B5EF4-FFF2-40B4-BE49-F238E27FC236}">
+                <a16:creationId xmlns:a16="http://schemas.microsoft.com/office/drawing/2014/main" id="{65B55F7E-B991-6BCE-2D19-6A3466AF923E}"/>
+              </a:ext>
+            </a:extLst>
+          </p:cNvPr>
+          <p:cNvSpPr txBox="1"/>
+          <p:nvPr/>
+        </p:nvSpPr>
+        <p:spPr>
+          <a:xfrm>
+            <a:off x="581025" y="6096000"/>
+            <a:ext cx="10131425" cy="646331"/>
+          </a:xfrm>
+          <a:prstGeom prst="rect">
+            <a:avLst/>
+          </a:prstGeom>
+          <a:noFill/>
+        </p:spPr>
+        <p:txBody>
+          <a:bodyPr wrap="square" rtlCol="0">
+            <a:spAutoFit/>
+          </a:bodyPr>
+          <a:lstStyle/>
+          <a:p>
+            <a:r>
+              <a:rPr lang="en-US" altLang="zh-TW" dirty="0"/>
+              <a:t>The seed is like a random table. We can think of different seeds as different random tables. Please refer to </a:t>
+            </a:r>
+            <a:r>
+              <a:rPr lang="en-US" altLang="zh-TW" dirty="0" err="1">
+                <a:hlinkClick r:id="rId3"/>
+              </a:rPr>
+              <a:t>srand</a:t>
+            </a:r>
+            <a:r>
+              <a:rPr lang="en-US" altLang="zh-TW">
+                <a:hlinkClick r:id="rId3"/>
+              </a:rPr>
+              <a:t> - C++ Reference (cplusplus.com)</a:t>
+            </a:r>
+            <a:r>
+              <a:rPr lang="en-US" altLang="zh-TW"/>
+              <a:t>.</a:t>
+            </a:r>
+            <a:endParaRPr lang="zh-TW" altLang="en-US" dirty="0"/>
+          </a:p>
+        </p:txBody>
+      </p:sp>
     </p:spTree>
     <p:extLst>
       <p:ext uri="{BB962C8B-B14F-4D97-AF65-F5344CB8AC3E}">
@@ -7828,7 +7880,7 @@
         </p:nvSpPr>
         <p:spPr>
           <a:xfrm>
-            <a:off x="685801" y="1895399"/>
+            <a:off x="685801" y="1666799"/>
             <a:ext cx="8277837" cy="2031325"/>
           </a:xfrm>
           <a:prstGeom prst="rect">
@@ -8295,14 +8347,14 @@
           <p:nvPr>
             <p:extLst>
               <p:ext uri="{D42A27DB-BD31-4B8C-83A1-F6EECF244321}">
-                <p14:modId xmlns:p14="http://schemas.microsoft.com/office/powerpoint/2010/main" val="1097976884"/>
+                <p14:modId xmlns:p14="http://schemas.microsoft.com/office/powerpoint/2010/main" val="3404584559"/>
               </p:ext>
             </p:extLst>
           </p:nvPr>
         </p:nvGraphicFramePr>
         <p:xfrm>
-          <a:off x="755008" y="5005588"/>
-          <a:ext cx="5134065" cy="1483360"/>
+          <a:off x="731234" y="4501021"/>
+          <a:ext cx="5140968" cy="1483360"/>
         </p:xfrm>
         <a:graphic>
           <a:graphicData uri="http://schemas.openxmlformats.org/drawingml/2006/table">
@@ -8311,35 +8363,42 @@
                 <a:tableStyleId>{21E4AEA4-8DFA-4A89-87EB-49C32662AFE0}</a:tableStyleId>
               </a:tblPr>
               <a:tblGrid>
-                <a:gridCol w="1026813">
+                <a:gridCol w="856828">
+                  <a:extLst>
+                    <a:ext uri="{9D8B030D-6E8A-4147-A177-3AD203B41FA5}">
+                      <a16:colId xmlns:a16="http://schemas.microsoft.com/office/drawing/2014/main" val="69460370"/>
+                    </a:ext>
+                  </a:extLst>
+                </a:gridCol>
+                <a:gridCol w="856828">
                   <a:extLst>
                     <a:ext uri="{9D8B030D-6E8A-4147-A177-3AD203B41FA5}">
                       <a16:colId xmlns:a16="http://schemas.microsoft.com/office/drawing/2014/main" val="109659112"/>
                     </a:ext>
                   </a:extLst>
                 </a:gridCol>
-                <a:gridCol w="1026813">
+                <a:gridCol w="856828">
                   <a:extLst>
                     <a:ext uri="{9D8B030D-6E8A-4147-A177-3AD203B41FA5}">
                       <a16:colId xmlns:a16="http://schemas.microsoft.com/office/drawing/2014/main" val="3405095176"/>
                     </a:ext>
                   </a:extLst>
                 </a:gridCol>
-                <a:gridCol w="1026813">
+                <a:gridCol w="856828">
                   <a:extLst>
                     <a:ext uri="{9D8B030D-6E8A-4147-A177-3AD203B41FA5}">
                       <a16:colId xmlns:a16="http://schemas.microsoft.com/office/drawing/2014/main" val="1822018940"/>
                     </a:ext>
                   </a:extLst>
                 </a:gridCol>
-                <a:gridCol w="1026813">
+                <a:gridCol w="856828">
                   <a:extLst>
                     <a:ext uri="{9D8B030D-6E8A-4147-A177-3AD203B41FA5}">
                       <a16:colId xmlns:a16="http://schemas.microsoft.com/office/drawing/2014/main" val="1407225849"/>
                     </a:ext>
                   </a:extLst>
                 </a:gridCol>
-                <a:gridCol w="1026813">
+                <a:gridCol w="856828">
                   <a:extLst>
                     <a:ext uri="{9D8B030D-6E8A-4147-A177-3AD203B41FA5}">
                       <a16:colId xmlns:a16="http://schemas.microsoft.com/office/drawing/2014/main" val="2385728985"/>
@@ -8348,6 +8407,21 @@
                 </a:gridCol>
               </a:tblGrid>
               <a:tr h="370840">
+                <a:tc>
+                  <a:txBody>
+                    <a:bodyPr/>
+                    <a:lstStyle/>
+                    <a:p>
+                      <a:pPr algn="ctr"/>
+                      <a:r>
+                        <a:rPr lang="en-US" altLang="zh-TW" dirty="0"/>
+                        <a:t>s</a:t>
+                      </a:r>
+                      <a:endParaRPr lang="zh-TW" altLang="en-US" dirty="0"/>
+                    </a:p>
+                  </a:txBody>
+                  <a:tcPr/>
+                </a:tc>
                 <a:tc>
                   <a:txBody>
                     <a:bodyPr/>
@@ -8430,6 +8504,21 @@
                 </a:extLst>
               </a:tr>
               <a:tr h="370840">
+                <a:tc rowSpan="3">
+                  <a:txBody>
+                    <a:bodyPr/>
+                    <a:lstStyle/>
+                    <a:p>
+                      <a:pPr algn="ctr"/>
+                      <a:r>
+                        <a:rPr lang="en-US" altLang="zh-TW" dirty="0"/>
+                        <a:t>r</a:t>
+                      </a:r>
+                      <a:endParaRPr lang="zh-TW" altLang="en-US" dirty="0"/>
+                    </a:p>
+                  </a:txBody>
+                  <a:tcPr anchor="ctr"/>
+                </a:tc>
                 <a:tc>
                   <a:txBody>
                     <a:bodyPr/>
@@ -8512,6 +8601,17 @@
                 </a:extLst>
               </a:tr>
               <a:tr h="370840">
+                <a:tc vMerge="1">
+                  <a:txBody>
+                    <a:bodyPr/>
+                    <a:lstStyle/>
+                    <a:p>
+                      <a:pPr algn="ctr"/>
+                      <a:endParaRPr lang="zh-TW" altLang="en-US" dirty="0"/>
+                    </a:p>
+                  </a:txBody>
+                  <a:tcPr/>
+                </a:tc>
                 <a:tc>
                   <a:txBody>
                     <a:bodyPr/>
@@ -8594,6 +8694,17 @@
                 </a:extLst>
               </a:tr>
               <a:tr h="370840">
+                <a:tc vMerge="1">
+                  <a:txBody>
+                    <a:bodyPr/>
+                    <a:lstStyle/>
+                    <a:p>
+                      <a:pPr algn="ctr"/>
+                      <a:endParaRPr lang="zh-TW" altLang="en-US" dirty="0"/>
+                    </a:p>
+                  </a:txBody>
+                  <a:tcPr/>
+                </a:tc>
                 <a:tc>
                   <a:txBody>
                     <a:bodyPr/>
@@ -8681,7 +8792,7 @@
         </p:nvSpPr>
         <p:spPr>
           <a:xfrm>
-            <a:off x="731234" y="4089124"/>
+            <a:off x="731234" y="3670024"/>
             <a:ext cx="2743201" cy="461665"/>
           </a:xfrm>
           <a:prstGeom prst="rect">
@@ -8717,7 +8828,7 @@
         </p:nvSpPr>
         <p:spPr>
           <a:xfrm>
-            <a:off x="6519644" y="4089124"/>
+            <a:off x="6519644" y="3670024"/>
             <a:ext cx="3354199" cy="830997"/>
           </a:xfrm>
           <a:prstGeom prst="rect">
@@ -8760,14 +8871,14 @@
           <p:nvPr>
             <p:extLst>
               <p:ext uri="{D42A27DB-BD31-4B8C-83A1-F6EECF244321}">
-                <p14:modId xmlns:p14="http://schemas.microsoft.com/office/powerpoint/2010/main" val="3100032204"/>
+                <p14:modId xmlns:p14="http://schemas.microsoft.com/office/powerpoint/2010/main" val="461933414"/>
               </p:ext>
             </p:extLst>
           </p:nvPr>
         </p:nvGraphicFramePr>
         <p:xfrm>
-          <a:off x="6611922" y="5005588"/>
-          <a:ext cx="5134065" cy="1752600"/>
+          <a:off x="6519644" y="4501021"/>
+          <a:ext cx="5134068" cy="1752600"/>
         </p:xfrm>
         <a:graphic>
           <a:graphicData uri="http://schemas.openxmlformats.org/drawingml/2006/table">
@@ -8776,35 +8887,42 @@
                 <a:tableStyleId>{21E4AEA4-8DFA-4A89-87EB-49C32662AFE0}</a:tableStyleId>
               </a:tblPr>
               <a:tblGrid>
-                <a:gridCol w="1026813">
+                <a:gridCol w="855678">
+                  <a:extLst>
+                    <a:ext uri="{9D8B030D-6E8A-4147-A177-3AD203B41FA5}">
+                      <a16:colId xmlns:a16="http://schemas.microsoft.com/office/drawing/2014/main" val="1160444385"/>
+                    </a:ext>
+                  </a:extLst>
+                </a:gridCol>
+                <a:gridCol w="855678">
                   <a:extLst>
                     <a:ext uri="{9D8B030D-6E8A-4147-A177-3AD203B41FA5}">
                       <a16:colId xmlns:a16="http://schemas.microsoft.com/office/drawing/2014/main" val="109659112"/>
                     </a:ext>
                   </a:extLst>
                 </a:gridCol>
-                <a:gridCol w="1026813">
+                <a:gridCol w="855678">
                   <a:extLst>
                     <a:ext uri="{9D8B030D-6E8A-4147-A177-3AD203B41FA5}">
                       <a16:colId xmlns:a16="http://schemas.microsoft.com/office/drawing/2014/main" val="3405095176"/>
                     </a:ext>
                   </a:extLst>
                 </a:gridCol>
-                <a:gridCol w="1026813">
+                <a:gridCol w="855678">
                   <a:extLst>
                     <a:ext uri="{9D8B030D-6E8A-4147-A177-3AD203B41FA5}">
                       <a16:colId xmlns:a16="http://schemas.microsoft.com/office/drawing/2014/main" val="1822018940"/>
                     </a:ext>
                   </a:extLst>
                 </a:gridCol>
-                <a:gridCol w="1026813">
+                <a:gridCol w="855678">
                   <a:extLst>
                     <a:ext uri="{9D8B030D-6E8A-4147-A177-3AD203B41FA5}">
                       <a16:colId xmlns:a16="http://schemas.microsoft.com/office/drawing/2014/main" val="1407225849"/>
                     </a:ext>
                   </a:extLst>
                 </a:gridCol>
-                <a:gridCol w="1026813">
+                <a:gridCol w="855678">
                   <a:extLst>
                     <a:ext uri="{9D8B030D-6E8A-4147-A177-3AD203B41FA5}">
                       <a16:colId xmlns:a16="http://schemas.microsoft.com/office/drawing/2014/main" val="2385728985"/>
@@ -8813,6 +8931,21 @@
                 </a:gridCol>
               </a:tblGrid>
               <a:tr h="370840">
+                <a:tc>
+                  <a:txBody>
+                    <a:bodyPr/>
+                    <a:lstStyle/>
+                    <a:p>
+                      <a:pPr algn="ctr"/>
+                      <a:r>
+                        <a:rPr lang="en-US" altLang="zh-TW" dirty="0"/>
+                        <a:t>s</a:t>
+                      </a:r>
+                      <a:endParaRPr lang="zh-TW" altLang="en-US" dirty="0"/>
+                    </a:p>
+                  </a:txBody>
+                  <a:tcPr/>
+                </a:tc>
                 <a:tc>
                   <a:txBody>
                     <a:bodyPr/>
@@ -8895,6 +9028,21 @@
                 </a:extLst>
               </a:tr>
               <a:tr h="370840">
+                <a:tc rowSpan="3">
+                  <a:txBody>
+                    <a:bodyPr/>
+                    <a:lstStyle/>
+                    <a:p>
+                      <a:pPr algn="ctr"/>
+                      <a:r>
+                        <a:rPr lang="en-US" altLang="zh-TW" dirty="0"/>
+                        <a:t>r</a:t>
+                      </a:r>
+                      <a:endParaRPr lang="zh-TW" altLang="en-US" dirty="0"/>
+                    </a:p>
+                  </a:txBody>
+                  <a:tcPr anchor="ctr"/>
+                </a:tc>
                 <a:tc>
                   <a:txBody>
                     <a:bodyPr/>
@@ -8977,6 +9125,17 @@
                 </a:extLst>
               </a:tr>
               <a:tr h="370840">
+                <a:tc vMerge="1">
+                  <a:txBody>
+                    <a:bodyPr/>
+                    <a:lstStyle/>
+                    <a:p>
+                      <a:pPr algn="ctr"/>
+                      <a:endParaRPr lang="zh-TW" altLang="en-US" dirty="0"/>
+                    </a:p>
+                  </a:txBody>
+                  <a:tcPr/>
+                </a:tc>
                 <a:tc>
                   <a:txBody>
                     <a:bodyPr/>
@@ -9059,6 +9218,17 @@
                 </a:extLst>
               </a:tr>
               <a:tr h="370840">
+                <a:tc vMerge="1">
+                  <a:txBody>
+                    <a:bodyPr/>
+                    <a:lstStyle/>
+                    <a:p>
+                      <a:pPr algn="ctr"/>
+                      <a:endParaRPr lang="zh-TW" altLang="en-US" dirty="0"/>
+                    </a:p>
+                  </a:txBody>
+                  <a:tcPr/>
+                </a:tc>
                 <a:tc>
                   <a:txBody>
                     <a:bodyPr/>
@@ -9154,6 +9324,42 @@
           </a:graphicData>
         </a:graphic>
       </p:graphicFrame>
+      <p:sp>
+        <p:nvSpPr>
+          <p:cNvPr id="3" name="文字方塊 2">
+            <a:extLst>
+              <a:ext uri="{FF2B5EF4-FFF2-40B4-BE49-F238E27FC236}">
+                <a16:creationId xmlns:a16="http://schemas.microsoft.com/office/drawing/2014/main" id="{DF1EE152-B321-A46B-A720-74216B8D39D3}"/>
+              </a:ext>
+            </a:extLst>
+          </p:cNvPr>
+          <p:cNvSpPr txBox="1"/>
+          <p:nvPr/>
+        </p:nvSpPr>
+        <p:spPr>
+          <a:xfrm>
+            <a:off x="819150" y="6253621"/>
+            <a:ext cx="10963275" cy="646331"/>
+          </a:xfrm>
+          <a:prstGeom prst="rect">
+            <a:avLst/>
+          </a:prstGeom>
+          <a:noFill/>
+        </p:spPr>
+        <p:txBody>
+          <a:bodyPr wrap="square" rtlCol="0">
+            <a:spAutoFit/>
+          </a:bodyPr>
+          <a:lstStyle/>
+          <a:p>
+            <a:r>
+              <a:rPr lang="en-US" altLang="zh-TW" dirty="0"/>
+              <a:t>The purpose of the bucket is to make uniform distribution between 10-14. Therefore, we will discard r when r is equal to 10 or 11.</a:t>
+            </a:r>
+            <a:endParaRPr lang="zh-TW" altLang="en-US" dirty="0"/>
+          </a:p>
+        </p:txBody>
+      </p:sp>
     </p:spTree>
     <p:extLst>
       <p:ext uri="{BB962C8B-B14F-4D97-AF65-F5344CB8AC3E}">
@@ -11167,8 +11373,8 @@
         </p:nvSpPr>
         <p:spPr>
           <a:xfrm>
-            <a:off x="593508" y="2018916"/>
-            <a:ext cx="5413010" cy="1754326"/>
+            <a:off x="593508" y="1713194"/>
+            <a:ext cx="5413010" cy="2308324"/>
           </a:xfrm>
           <a:prstGeom prst="rect">
             <a:avLst/>
@@ -11187,6 +11393,15 @@
           <a:lstStyle/>
           <a:p>
             <a:r>
+              <a:rPr lang="en-US" altLang="zh-TW" b="1" dirty="0"/>
+              <a:t>Install instructions on Linux</a:t>
+            </a:r>
+          </a:p>
+          <a:p>
+            <a:endParaRPr lang="en-US" altLang="zh-TW" dirty="0"/>
+          </a:p>
+          <a:p>
+            <a:r>
               <a:rPr lang="en-US" altLang="zh-TW" dirty="0" err="1"/>
               <a:t>sudo</a:t>
             </a:r>
@@ -11267,7 +11482,7 @@
         <p:spPr>
           <a:xfrm>
             <a:off x="593508" y="4191969"/>
-            <a:ext cx="6797193" cy="1477328"/>
+            <a:ext cx="6797193" cy="2031325"/>
           </a:xfrm>
           <a:prstGeom prst="rect">
             <a:avLst/>
@@ -11284,6 +11499,15 @@
             <a:spAutoFit/>
           </a:bodyPr>
           <a:lstStyle/>
+          <a:p>
+            <a:r>
+              <a:rPr lang="en-US" altLang="zh-TW" b="1" dirty="0"/>
+              <a:t>Install instructions with MinGW on Windows</a:t>
+            </a:r>
+          </a:p>
+          <a:p>
+            <a:endParaRPr lang="en-US" altLang="zh-TW" dirty="0"/>
+          </a:p>
           <a:p>
             <a:r>
               <a:rPr lang="en-US" altLang="zh-TW" dirty="0"/>

</xml_diff>

<commit_message>
revise context on lab04-ppt
</commit_message>
<xml_diff>
--- a/lab04-googletest/00-lab04.pptx
+++ b/lab04-googletest/00-lab04.pptx
@@ -357,7 +357,7 @@
             <a:fld id="{B61BEF0D-F0BB-DE4B-95CE-6DB70DBA9567}" type="datetimeFigureOut">
               <a:rPr lang="en-US" dirty="0"/>
               <a:pPr/>
-              <a:t>5/16/2022</a:t>
+              <a:t>5/17/2022</a:t>
             </a:fld>
             <a:endParaRPr lang="en-US" dirty="0"/>
           </a:p>
@@ -688,7 +688,7 @@
             <a:fld id="{B61BEF0D-F0BB-DE4B-95CE-6DB70DBA9567}" type="datetimeFigureOut">
               <a:rPr lang="en-US" dirty="0"/>
               <a:pPr/>
-              <a:t>5/16/2022</a:t>
+              <a:t>5/17/2022</a:t>
             </a:fld>
             <a:endParaRPr lang="en-US" dirty="0"/>
           </a:p>
@@ -963,7 +963,7 @@
             <a:fld id="{B61BEF0D-F0BB-DE4B-95CE-6DB70DBA9567}" type="datetimeFigureOut">
               <a:rPr lang="en-US" dirty="0"/>
               <a:pPr/>
-              <a:t>5/16/2022</a:t>
+              <a:t>5/17/2022</a:t>
             </a:fld>
             <a:endParaRPr lang="en-US" dirty="0"/>
           </a:p>
@@ -1528,7 +1528,7 @@
             <a:fld id="{B61BEF0D-F0BB-DE4B-95CE-6DB70DBA9567}" type="datetimeFigureOut">
               <a:rPr lang="en-US" dirty="0"/>
               <a:pPr/>
-              <a:t>5/16/2022</a:t>
+              <a:t>5/17/2022</a:t>
             </a:fld>
             <a:endParaRPr lang="en-US" dirty="0"/>
           </a:p>
@@ -1803,7 +1803,7 @@
             <a:fld id="{B61BEF0D-F0BB-DE4B-95CE-6DB70DBA9567}" type="datetimeFigureOut">
               <a:rPr lang="en-US" dirty="0"/>
               <a:pPr/>
-              <a:t>5/16/2022</a:t>
+              <a:t>5/17/2022</a:t>
             </a:fld>
             <a:endParaRPr lang="en-US" dirty="0"/>
           </a:p>
@@ -2362,7 +2362,7 @@
             <a:fld id="{B61BEF0D-F0BB-DE4B-95CE-6DB70DBA9567}" type="datetimeFigureOut">
               <a:rPr lang="en-US" dirty="0"/>
               <a:pPr/>
-              <a:t>5/16/2022</a:t>
+              <a:t>5/17/2022</a:t>
             </a:fld>
             <a:endParaRPr lang="en-US" dirty="0"/>
           </a:p>
@@ -2686,7 +2686,7 @@
             <a:fld id="{B61BEF0D-F0BB-DE4B-95CE-6DB70DBA9567}" type="datetimeFigureOut">
               <a:rPr lang="en-US" dirty="0"/>
               <a:pPr/>
-              <a:t>5/16/2022</a:t>
+              <a:t>5/17/2022</a:t>
             </a:fld>
             <a:endParaRPr lang="en-US" dirty="0"/>
           </a:p>
@@ -2860,7 +2860,7 @@
             <a:fld id="{B61BEF0D-F0BB-DE4B-95CE-6DB70DBA9567}" type="datetimeFigureOut">
               <a:rPr lang="en-US" dirty="0"/>
               <a:pPr/>
-              <a:t>5/16/2022</a:t>
+              <a:t>5/17/2022</a:t>
             </a:fld>
             <a:endParaRPr lang="en-US" dirty="0"/>
           </a:p>
@@ -3095,7 +3095,7 @@
             <a:fld id="{B61BEF0D-F0BB-DE4B-95CE-6DB70DBA9567}" type="datetimeFigureOut">
               <a:rPr lang="en-US" dirty="0"/>
               <a:pPr/>
-              <a:t>5/16/2022</a:t>
+              <a:t>5/17/2022</a:t>
             </a:fld>
             <a:endParaRPr lang="en-US" dirty="0"/>
           </a:p>
@@ -3292,7 +3292,7 @@
             <a:fld id="{B61BEF0D-F0BB-DE4B-95CE-6DB70DBA9567}" type="datetimeFigureOut">
               <a:rPr lang="en-US" dirty="0"/>
               <a:pPr/>
-              <a:t>5/16/2022</a:t>
+              <a:t>5/17/2022</a:t>
             </a:fld>
             <a:endParaRPr lang="en-US" dirty="0"/>
           </a:p>
@@ -3565,7 +3565,7 @@
             <a:fld id="{B61BEF0D-F0BB-DE4B-95CE-6DB70DBA9567}" type="datetimeFigureOut">
               <a:rPr lang="en-US" dirty="0"/>
               <a:pPr/>
-              <a:t>5/16/2022</a:t>
+              <a:t>5/17/2022</a:t>
             </a:fld>
             <a:endParaRPr lang="en-US" dirty="0"/>
           </a:p>
@@ -3828,7 +3828,7 @@
             <a:fld id="{B61BEF0D-F0BB-DE4B-95CE-6DB70DBA9567}" type="datetimeFigureOut">
               <a:rPr lang="en-US" dirty="0"/>
               <a:pPr/>
-              <a:t>5/16/2022</a:t>
+              <a:t>5/17/2022</a:t>
             </a:fld>
             <a:endParaRPr lang="en-US" dirty="0"/>
           </a:p>
@@ -4199,7 +4199,7 @@
             <a:fld id="{B61BEF0D-F0BB-DE4B-95CE-6DB70DBA9567}" type="datetimeFigureOut">
               <a:rPr lang="en-US" dirty="0"/>
               <a:pPr/>
-              <a:t>5/16/2022</a:t>
+              <a:t>5/17/2022</a:t>
             </a:fld>
             <a:endParaRPr lang="en-US" dirty="0"/>
           </a:p>
@@ -4344,7 +4344,7 @@
             <a:fld id="{B61BEF0D-F0BB-DE4B-95CE-6DB70DBA9567}" type="datetimeFigureOut">
               <a:rPr lang="en-US" dirty="0"/>
               <a:pPr/>
-              <a:t>5/16/2022</a:t>
+              <a:t>5/17/2022</a:t>
             </a:fld>
             <a:endParaRPr lang="en-US" dirty="0"/>
           </a:p>
@@ -4466,7 +4466,7 @@
             <a:fld id="{B61BEF0D-F0BB-DE4B-95CE-6DB70DBA9567}" type="datetimeFigureOut">
               <a:rPr lang="en-US" dirty="0"/>
               <a:pPr/>
-              <a:t>5/16/2022</a:t>
+              <a:t>5/17/2022</a:t>
             </a:fld>
             <a:endParaRPr lang="en-US" dirty="0"/>
           </a:p>
@@ -4748,7 +4748,7 @@
             <a:fld id="{B61BEF0D-F0BB-DE4B-95CE-6DB70DBA9567}" type="datetimeFigureOut">
               <a:rPr lang="en-US" dirty="0"/>
               <a:pPr/>
-              <a:t>5/16/2022</a:t>
+              <a:t>5/17/2022</a:t>
             </a:fld>
             <a:endParaRPr lang="en-US" dirty="0"/>
           </a:p>
@@ -5069,7 +5069,7 @@
             <a:fld id="{B61BEF0D-F0BB-DE4B-95CE-6DB70DBA9567}" type="datetimeFigureOut">
               <a:rPr lang="en-US" dirty="0"/>
               <a:pPr/>
-              <a:t>5/16/2022</a:t>
+              <a:t>5/17/2022</a:t>
             </a:fld>
             <a:endParaRPr lang="en-US" dirty="0"/>
           </a:p>
@@ -5280,7 +5280,7 @@
             <a:fld id="{B61BEF0D-F0BB-DE4B-95CE-6DB70DBA9567}" type="datetimeFigureOut">
               <a:rPr lang="en-US" dirty="0"/>
               <a:pPr/>
-              <a:t>5/16/2022</a:t>
+              <a:t>5/17/2022</a:t>
             </a:fld>
             <a:endParaRPr lang="en-US" dirty="0"/>
           </a:p>
@@ -6093,7 +6093,7 @@
         </p:nvSpPr>
         <p:spPr>
           <a:xfrm>
-            <a:off x="0" y="6420535"/>
+            <a:off x="0" y="6470303"/>
             <a:ext cx="7953375" cy="369332"/>
           </a:xfrm>
           <a:prstGeom prst="rect">
@@ -7769,8 +7769,8 @@
         </p:nvSpPr>
         <p:spPr>
           <a:xfrm>
-            <a:off x="581025" y="6096000"/>
-            <a:ext cx="10131425" cy="646331"/>
+            <a:off x="0" y="6211669"/>
+            <a:ext cx="11563350" cy="646331"/>
           </a:xfrm>
           <a:prstGeom prst="rect">
             <a:avLst/>
@@ -7785,23 +7785,13 @@
           <a:p>
             <a:r>
               <a:rPr lang="en-US" altLang="zh-TW" dirty="0"/>
-              <a:t>The seed is like a random table. We can think of different seeds as different random tables. Please refer to </a:t>
-            </a:r>
-            <a:r>
-              <a:rPr lang="en-US" altLang="zh-TW" dirty="0" err="1">
-                <a:hlinkClick r:id="rId3"/>
-              </a:rPr>
-              <a:t>srand</a:t>
-            </a:r>
-            <a:r>
-              <a:rPr lang="en-US" altLang="zh-TW">
-                <a:hlinkClick r:id="rId3"/>
-              </a:rPr>
-              <a:t> - C++ Reference (cplusplus.com)</a:t>
-            </a:r>
-            <a:r>
-              <a:rPr lang="en-US" altLang="zh-TW"/>
-              <a:t>.</a:t>
+              <a:t>The seed is like a random table. The initialization with different seeds will generate different random tables.</a:t>
+            </a:r>
+          </a:p>
+          <a:p>
+            <a:r>
+              <a:rPr lang="en-US" altLang="zh-TW" dirty="0"/>
+              <a:t>https://www.cplusplus.com/reference/cstdlib/srand/</a:t>
             </a:r>
             <a:endParaRPr lang="zh-TW" altLang="en-US" dirty="0"/>
           </a:p>
@@ -9338,8 +9328,8 @@
         </p:nvSpPr>
         <p:spPr>
           <a:xfrm>
-            <a:off x="819150" y="6253621"/>
-            <a:ext cx="10963275" cy="646331"/>
+            <a:off x="0" y="6240244"/>
+            <a:ext cx="11972925" cy="646331"/>
           </a:xfrm>
           <a:prstGeom prst="rect">
             <a:avLst/>
@@ -9354,7 +9344,7 @@
           <a:p>
             <a:r>
               <a:rPr lang="en-US" altLang="zh-TW" dirty="0"/>
-              <a:t>The purpose of the bucket is to make uniform distribution between 10-14. Therefore, we will discard r when r is equal to 10 or 11.</a:t>
+              <a:t>The purpose of the bucket is to make a uniform distribution between [10, 14]. Therefore, r will be discarded when r is equal to 10 or 11.</a:t>
             </a:r>
             <a:endParaRPr lang="zh-TW" altLang="en-US" dirty="0"/>
           </a:p>

</xml_diff>